<commit_message>
Just a couple small edits to layout
</commit_message>
<xml_diff>
--- a/Project_1_Superheros.pptx
+++ b/Project_1_Superheros.pptx
@@ -225,7 +225,7 @@
           <a:p>
             <a:fld id="{9C98B144-16DC-4979-9693-C525CA986809}" type="datetimeFigureOut">
               <a:rPr lang="en-US" smtClean="0"/>
-              <a:t>4/14/2019</a:t>
+              <a:t>4/15/2019</a:t>
             </a:fld>
             <a:endParaRPr lang="en-US"/>
           </a:p>
@@ -1784,7 +1784,7 @@
           <a:p>
             <a:fld id="{913DB1DE-0B1F-4B58-83A2-758AD1F56FCE}" type="datetimeFigureOut">
               <a:rPr lang="en-US" smtClean="0"/>
-              <a:t>4/14/2019</a:t>
+              <a:t>4/15/2019</a:t>
             </a:fld>
             <a:endParaRPr lang="en-US"/>
           </a:p>
@@ -1982,7 +1982,7 @@
           <a:p>
             <a:fld id="{913DB1DE-0B1F-4B58-83A2-758AD1F56FCE}" type="datetimeFigureOut">
               <a:rPr lang="en-US" smtClean="0"/>
-              <a:t>4/14/2019</a:t>
+              <a:t>4/15/2019</a:t>
             </a:fld>
             <a:endParaRPr lang="en-US"/>
           </a:p>
@@ -2190,7 +2190,7 @@
           <a:p>
             <a:fld id="{913DB1DE-0B1F-4B58-83A2-758AD1F56FCE}" type="datetimeFigureOut">
               <a:rPr lang="en-US" smtClean="0"/>
-              <a:t>4/14/2019</a:t>
+              <a:t>4/15/2019</a:t>
             </a:fld>
             <a:endParaRPr lang="en-US"/>
           </a:p>
@@ -2388,7 +2388,7 @@
           <a:p>
             <a:fld id="{913DB1DE-0B1F-4B58-83A2-758AD1F56FCE}" type="datetimeFigureOut">
               <a:rPr lang="en-US" smtClean="0"/>
-              <a:t>4/14/2019</a:t>
+              <a:t>4/15/2019</a:t>
             </a:fld>
             <a:endParaRPr lang="en-US"/>
           </a:p>
@@ -2663,7 +2663,7 @@
           <a:p>
             <a:fld id="{913DB1DE-0B1F-4B58-83A2-758AD1F56FCE}" type="datetimeFigureOut">
               <a:rPr lang="en-US" smtClean="0"/>
-              <a:t>4/14/2019</a:t>
+              <a:t>4/15/2019</a:t>
             </a:fld>
             <a:endParaRPr lang="en-US"/>
           </a:p>
@@ -2928,7 +2928,7 @@
           <a:p>
             <a:fld id="{913DB1DE-0B1F-4B58-83A2-758AD1F56FCE}" type="datetimeFigureOut">
               <a:rPr lang="en-US" smtClean="0"/>
-              <a:t>4/14/2019</a:t>
+              <a:t>4/15/2019</a:t>
             </a:fld>
             <a:endParaRPr lang="en-US"/>
           </a:p>
@@ -3340,7 +3340,7 @@
           <a:p>
             <a:fld id="{913DB1DE-0B1F-4B58-83A2-758AD1F56FCE}" type="datetimeFigureOut">
               <a:rPr lang="en-US" smtClean="0"/>
-              <a:t>4/14/2019</a:t>
+              <a:t>4/15/2019</a:t>
             </a:fld>
             <a:endParaRPr lang="en-US"/>
           </a:p>
@@ -3481,7 +3481,7 @@
           <a:p>
             <a:fld id="{913DB1DE-0B1F-4B58-83A2-758AD1F56FCE}" type="datetimeFigureOut">
               <a:rPr lang="en-US" smtClean="0"/>
-              <a:t>4/14/2019</a:t>
+              <a:t>4/15/2019</a:t>
             </a:fld>
             <a:endParaRPr lang="en-US"/>
           </a:p>
@@ -3594,7 +3594,7 @@
           <a:p>
             <a:fld id="{913DB1DE-0B1F-4B58-83A2-758AD1F56FCE}" type="datetimeFigureOut">
               <a:rPr lang="en-US" smtClean="0"/>
-              <a:t>4/14/2019</a:t>
+              <a:t>4/15/2019</a:t>
             </a:fld>
             <a:endParaRPr lang="en-US"/>
           </a:p>
@@ -3905,7 +3905,7 @@
           <a:p>
             <a:fld id="{913DB1DE-0B1F-4B58-83A2-758AD1F56FCE}" type="datetimeFigureOut">
               <a:rPr lang="en-US" smtClean="0"/>
-              <a:t>4/14/2019</a:t>
+              <a:t>4/15/2019</a:t>
             </a:fld>
             <a:endParaRPr lang="en-US"/>
           </a:p>
@@ -4193,7 +4193,7 @@
           <a:p>
             <a:fld id="{913DB1DE-0B1F-4B58-83A2-758AD1F56FCE}" type="datetimeFigureOut">
               <a:rPr lang="en-US" smtClean="0"/>
-              <a:t>4/14/2019</a:t>
+              <a:t>4/15/2019</a:t>
             </a:fld>
             <a:endParaRPr lang="en-US"/>
           </a:p>
@@ -4457,7 +4457,7 @@
           <a:p>
             <a:fld id="{913DB1DE-0B1F-4B58-83A2-758AD1F56FCE}" type="datetimeFigureOut">
               <a:rPr lang="en-US" smtClean="0"/>
-              <a:t>4/14/2019</a:t>
+              <a:t>4/15/2019</a:t>
             </a:fld>
             <a:endParaRPr lang="en-US"/>
           </a:p>
@@ -5656,10 +5656,10 @@
       </p:pic>
       <p:sp>
         <p:nvSpPr>
-          <p:cNvPr id="7" name="Content Placeholder 2">
-            <a:extLst>
-              <a:ext uri="{FF2B5EF4-FFF2-40B4-BE49-F238E27FC236}">
-                <a16:creationId xmlns:a16="http://schemas.microsoft.com/office/drawing/2014/main" id="{5C79595F-587D-45C8-88C0-94DAA435648C}"/>
+          <p:cNvPr id="10" name="Content Placeholder 2">
+            <a:extLst>
+              <a:ext uri="{FF2B5EF4-FFF2-40B4-BE49-F238E27FC236}">
+                <a16:creationId xmlns:a16="http://schemas.microsoft.com/office/drawing/2014/main" id="{8237138C-EB6F-481E-BD1E-A835FBAA6691}"/>
               </a:ext>
             </a:extLst>
           </p:cNvPr>
@@ -5670,8 +5670,8 @@
         </p:nvSpPr>
         <p:spPr>
           <a:xfrm>
-            <a:off x="0" y="1159046"/>
-            <a:ext cx="6099048" cy="1635550"/>
+            <a:off x="1524" y="1143000"/>
+            <a:ext cx="6257386" cy="5714999"/>
           </a:xfrm>
           <a:prstGeom prst="rect">
             <a:avLst/>
@@ -5679,7 +5679,7 @@
         </p:spPr>
         <p:txBody>
           <a:bodyPr vert="horz" lIns="91440" tIns="45720" rIns="91440" bIns="45720" rtlCol="0">
-            <a:normAutofit fontScale="85000" lnSpcReduction="10000"/>
+            <a:normAutofit/>
           </a:bodyPr>
           <a:lstStyle>
             <a:lvl1pPr marL="228600" indent="-228600" algn="l" defTabSz="914400" rtl="0" eaLnBrk="1" latinLnBrk="0" hangingPunct="1">
@@ -5847,13 +5847,13 @@
           </a:lstStyle>
           <a:p>
             <a:r>
-              <a:rPr lang="en-US" sz="4000" dirty="0"/>
+              <a:rPr lang="en-US" sz="3600" dirty="0"/>
               <a:t>No correlation between power level and box office sales</a:t>
             </a:r>
           </a:p>
           <a:p>
             <a:r>
-              <a:rPr lang="en-US" sz="4000" dirty="0"/>
+              <a:rPr lang="en-US" sz="3600" dirty="0"/>
               <a:t>Sales: p-value = 0.4051</a:t>
             </a:r>
           </a:p>
@@ -5861,10 +5861,10 @@
       </p:sp>
       <p:sp>
         <p:nvSpPr>
-          <p:cNvPr id="8" name="Content Placeholder 2">
-            <a:extLst>
-              <a:ext uri="{FF2B5EF4-FFF2-40B4-BE49-F238E27FC236}">
-                <a16:creationId xmlns:a16="http://schemas.microsoft.com/office/drawing/2014/main" id="{82E27A72-60D3-4CA5-8F86-E8F83B279343}"/>
+          <p:cNvPr id="11" name="Content Placeholder 2">
+            <a:extLst>
+              <a:ext uri="{FF2B5EF4-FFF2-40B4-BE49-F238E27FC236}">
+                <a16:creationId xmlns:a16="http://schemas.microsoft.com/office/drawing/2014/main" id="{30716FFD-A9B9-4A57-B8F7-19E84F2BAF11}"/>
               </a:ext>
             </a:extLst>
           </p:cNvPr>
@@ -5875,8 +5875,8 @@
         </p:nvSpPr>
         <p:spPr>
           <a:xfrm>
-            <a:off x="6092952" y="1159046"/>
-            <a:ext cx="6099048" cy="1635550"/>
+            <a:off x="6092952" y="1143000"/>
+            <a:ext cx="6099048" cy="5714999"/>
           </a:xfrm>
           <a:prstGeom prst="rect">
             <a:avLst/>
@@ -5884,7 +5884,7 @@
         </p:spPr>
         <p:txBody>
           <a:bodyPr vert="horz" lIns="91440" tIns="45720" rIns="91440" bIns="45720" rtlCol="0">
-            <a:normAutofit fontScale="85000" lnSpcReduction="10000"/>
+            <a:normAutofit/>
           </a:bodyPr>
           <a:lstStyle>
             <a:lvl1pPr marL="228600" indent="-228600" algn="l" defTabSz="914400" rtl="0" eaLnBrk="1" latinLnBrk="0" hangingPunct="1">
@@ -6052,13 +6052,13 @@
           </a:lstStyle>
           <a:p>
             <a:r>
-              <a:rPr lang="en-US" sz="4000" dirty="0"/>
+              <a:rPr lang="en-US" sz="3600" dirty="0"/>
               <a:t>No correlation between power level and viewer ratings</a:t>
             </a:r>
           </a:p>
           <a:p>
             <a:r>
-              <a:rPr lang="en-US" sz="4000" dirty="0"/>
+              <a:rPr lang="en-US" sz="3600" dirty="0"/>
               <a:t>Rating: p-value = 0.9693</a:t>
             </a:r>
           </a:p>
@@ -8498,7 +8498,7 @@
             </a:r>
             <a:r>
               <a:rPr lang="en-US" b="1" dirty="0"/>
-              <a:t>power level, race (human vs. non-human), gender, and alignment</a:t>
+              <a:t>power level, race (human vs. non-human), gender, and alignment (good vs. bad vs. neutral</a:t>
             </a:r>
             <a:r>
               <a:rPr lang="en-US" dirty="0"/>
@@ -11945,7 +11945,7 @@
           <a:p>
             <a:r>
               <a:rPr lang="en-US" dirty="0"/>
-              <a:t>Ranked movies by US Sales (adjusted for inflation)</a:t>
+              <a:t>Ranked movies by U.S. Sales (adjusted for inflation)</a:t>
             </a:r>
           </a:p>
           <a:p>
@@ -12189,7 +12189,7 @@
           <a:p>
             <a:r>
               <a:rPr lang="en-US" b="1" dirty="0"/>
-              <a:t>Superhero movies by viewer rating (Rotten Tomatoes)</a:t>
+              <a:t>Superhero Movies by Viewer Rating (Rotten Tomatoes)</a:t>
             </a:r>
           </a:p>
         </p:txBody>

</xml_diff>